<commit_message>
add sample_method in dbRDA
</commit_message>
<xml_diff>
--- a/outputs/Figures.pptx
+++ b/outputs/Figures.pptx
@@ -7,6 +7,7 @@
   <p:sldIdLst>
     <p:sldId id="257" r:id="rId2"/>
     <p:sldId id="258" r:id="rId3"/>
+    <p:sldId id="259" r:id="rId4"/>
   </p:sldIdLst>
   <p:sldSz cx="9144000" cy="6858000" type="screen4x3"/>
   <p:notesSz cx="6858000" cy="9144000"/>
@@ -244,7 +245,7 @@
           <a:p>
             <a:fld id="{E9B23B7C-432E-4D69-AF1C-60ED56ABBCA5}" type="datetimeFigureOut">
               <a:rPr lang="fr-FR" smtClean="0"/>
-              <a:t>06/01/2022</a:t>
+              <a:t>16/01/2022</a:t>
             </a:fld>
             <a:endParaRPr lang="fr-FR"/>
           </a:p>
@@ -414,7 +415,7 @@
           <a:p>
             <a:fld id="{E9B23B7C-432E-4D69-AF1C-60ED56ABBCA5}" type="datetimeFigureOut">
               <a:rPr lang="fr-FR" smtClean="0"/>
-              <a:t>06/01/2022</a:t>
+              <a:t>16/01/2022</a:t>
             </a:fld>
             <a:endParaRPr lang="fr-FR"/>
           </a:p>
@@ -594,7 +595,7 @@
           <a:p>
             <a:fld id="{E9B23B7C-432E-4D69-AF1C-60ED56ABBCA5}" type="datetimeFigureOut">
               <a:rPr lang="fr-FR" smtClean="0"/>
-              <a:t>06/01/2022</a:t>
+              <a:t>16/01/2022</a:t>
             </a:fld>
             <a:endParaRPr lang="fr-FR"/>
           </a:p>
@@ -764,7 +765,7 @@
           <a:p>
             <a:fld id="{E9B23B7C-432E-4D69-AF1C-60ED56ABBCA5}" type="datetimeFigureOut">
               <a:rPr lang="fr-FR" smtClean="0"/>
-              <a:t>06/01/2022</a:t>
+              <a:t>16/01/2022</a:t>
             </a:fld>
             <a:endParaRPr lang="fr-FR"/>
           </a:p>
@@ -1010,7 +1011,7 @@
           <a:p>
             <a:fld id="{E9B23B7C-432E-4D69-AF1C-60ED56ABBCA5}" type="datetimeFigureOut">
               <a:rPr lang="fr-FR" smtClean="0"/>
-              <a:t>06/01/2022</a:t>
+              <a:t>16/01/2022</a:t>
             </a:fld>
             <a:endParaRPr lang="fr-FR"/>
           </a:p>
@@ -1242,7 +1243,7 @@
           <a:p>
             <a:fld id="{E9B23B7C-432E-4D69-AF1C-60ED56ABBCA5}" type="datetimeFigureOut">
               <a:rPr lang="fr-FR" smtClean="0"/>
-              <a:t>06/01/2022</a:t>
+              <a:t>16/01/2022</a:t>
             </a:fld>
             <a:endParaRPr lang="fr-FR"/>
           </a:p>
@@ -1609,7 +1610,7 @@
           <a:p>
             <a:fld id="{E9B23B7C-432E-4D69-AF1C-60ED56ABBCA5}" type="datetimeFigureOut">
               <a:rPr lang="fr-FR" smtClean="0"/>
-              <a:t>06/01/2022</a:t>
+              <a:t>16/01/2022</a:t>
             </a:fld>
             <a:endParaRPr lang="fr-FR"/>
           </a:p>
@@ -1727,7 +1728,7 @@
           <a:p>
             <a:fld id="{E9B23B7C-432E-4D69-AF1C-60ED56ABBCA5}" type="datetimeFigureOut">
               <a:rPr lang="fr-FR" smtClean="0"/>
-              <a:t>06/01/2022</a:t>
+              <a:t>16/01/2022</a:t>
             </a:fld>
             <a:endParaRPr lang="fr-FR"/>
           </a:p>
@@ -1822,7 +1823,7 @@
           <a:p>
             <a:fld id="{E9B23B7C-432E-4D69-AF1C-60ED56ABBCA5}" type="datetimeFigureOut">
               <a:rPr lang="fr-FR" smtClean="0"/>
-              <a:t>06/01/2022</a:t>
+              <a:t>16/01/2022</a:t>
             </a:fld>
             <a:endParaRPr lang="fr-FR"/>
           </a:p>
@@ -2099,7 +2100,7 @@
           <a:p>
             <a:fld id="{E9B23B7C-432E-4D69-AF1C-60ED56ABBCA5}" type="datetimeFigureOut">
               <a:rPr lang="fr-FR" smtClean="0"/>
-              <a:t>06/01/2022</a:t>
+              <a:t>16/01/2022</a:t>
             </a:fld>
             <a:endParaRPr lang="fr-FR"/>
           </a:p>
@@ -2352,7 +2353,7 @@
           <a:p>
             <a:fld id="{E9B23B7C-432E-4D69-AF1C-60ED56ABBCA5}" type="datetimeFigureOut">
               <a:rPr lang="fr-FR" smtClean="0"/>
-              <a:t>06/01/2022</a:t>
+              <a:t>16/01/2022</a:t>
             </a:fld>
             <a:endParaRPr lang="fr-FR"/>
           </a:p>
@@ -2565,7 +2566,7 @@
           <a:p>
             <a:fld id="{E9B23B7C-432E-4D69-AF1C-60ED56ABBCA5}" type="datetimeFigureOut">
               <a:rPr lang="fr-FR" smtClean="0"/>
-              <a:t>06/01/2022</a:t>
+              <a:t>16/01/2022</a:t>
             </a:fld>
             <a:endParaRPr lang="fr-FR"/>
           </a:p>
@@ -3242,6 +3243,291 @@
 </p:sld>
 </file>
 
+<file path=ppt/slides/slide3.xml><?xml version="1.0" encoding="utf-8"?>
+<p:sld xmlns:a="http://schemas.openxmlformats.org/drawingml/2006/main" xmlns:r="http://schemas.openxmlformats.org/officeDocument/2006/relationships" xmlns:p="http://schemas.openxmlformats.org/presentationml/2006/main">
+  <p:cSld>
+    <p:spTree>
+      <p:nvGrpSpPr>
+        <p:cNvPr id="1" name=""/>
+        <p:cNvGrpSpPr/>
+        <p:nvPr/>
+      </p:nvGrpSpPr>
+      <p:grpSpPr>
+        <a:xfrm>
+          <a:off x="0" y="0"/>
+          <a:ext cx="0" cy="0"/>
+          <a:chOff x="0" y="0"/>
+          <a:chExt cx="0" cy="0"/>
+        </a:xfrm>
+      </p:grpSpPr>
+      <p:grpSp>
+        <p:nvGrpSpPr>
+          <p:cNvPr id="12" name="Groupe 11"/>
+          <p:cNvGrpSpPr/>
+          <p:nvPr/>
+        </p:nvGrpSpPr>
+        <p:grpSpPr>
+          <a:xfrm>
+            <a:off x="467289" y="107014"/>
+            <a:ext cx="7631816" cy="6698522"/>
+            <a:chOff x="467289" y="107014"/>
+            <a:chExt cx="7631816" cy="6698522"/>
+          </a:xfrm>
+        </p:grpSpPr>
+        <p:pic>
+          <p:nvPicPr>
+            <p:cNvPr id="6" name="Image 5"/>
+            <p:cNvPicPr>
+              <a:picLocks noChangeAspect="1"/>
+            </p:cNvPicPr>
+            <p:nvPr/>
+          </p:nvPicPr>
+          <p:blipFill>
+            <a:blip r:embed="rId2">
+              <a:extLst>
+                <a:ext uri="{28A0092B-C50C-407E-A947-70E740481C1C}">
+                  <a14:useLocalDpi xmlns:a14="http://schemas.microsoft.com/office/drawing/2010/main" val="0"/>
+                </a:ext>
+              </a:extLst>
+            </a:blip>
+            <a:stretch>
+              <a:fillRect/>
+            </a:stretch>
+          </p:blipFill>
+          <p:spPr>
+            <a:xfrm>
+              <a:off x="539196" y="3290186"/>
+              <a:ext cx="3773621" cy="3515350"/>
+            </a:xfrm>
+            <a:prstGeom prst="rect">
+              <a:avLst/>
+            </a:prstGeom>
+          </p:spPr>
+        </p:pic>
+        <p:pic>
+          <p:nvPicPr>
+            <p:cNvPr id="5" name="Image 4"/>
+            <p:cNvPicPr>
+              <a:picLocks noChangeAspect="1"/>
+            </p:cNvPicPr>
+            <p:nvPr/>
+          </p:nvPicPr>
+          <p:blipFill>
+            <a:blip r:embed="rId3">
+              <a:extLst>
+                <a:ext uri="{28A0092B-C50C-407E-A947-70E740481C1C}">
+                  <a14:useLocalDpi xmlns:a14="http://schemas.microsoft.com/office/drawing/2010/main" val="0"/>
+                </a:ext>
+              </a:extLst>
+            </a:blip>
+            <a:stretch>
+              <a:fillRect/>
+            </a:stretch>
+          </p:blipFill>
+          <p:spPr>
+            <a:xfrm>
+              <a:off x="4325484" y="3264790"/>
+              <a:ext cx="3773621" cy="3515350"/>
+            </a:xfrm>
+            <a:prstGeom prst="rect">
+              <a:avLst/>
+            </a:prstGeom>
+          </p:spPr>
+        </p:pic>
+        <p:pic>
+          <p:nvPicPr>
+            <p:cNvPr id="4" name="Image 3"/>
+            <p:cNvPicPr>
+              <a:picLocks noChangeAspect="1"/>
+            </p:cNvPicPr>
+            <p:nvPr/>
+          </p:nvPicPr>
+          <p:blipFill>
+            <a:blip r:embed="rId4">
+              <a:extLst>
+                <a:ext uri="{28A0092B-C50C-407E-A947-70E740481C1C}">
+                  <a14:useLocalDpi xmlns:a14="http://schemas.microsoft.com/office/drawing/2010/main" val="0"/>
+                </a:ext>
+              </a:extLst>
+            </a:blip>
+            <a:stretch>
+              <a:fillRect/>
+            </a:stretch>
+          </p:blipFill>
+          <p:spPr>
+            <a:xfrm>
+              <a:off x="4283197" y="153383"/>
+              <a:ext cx="3741332" cy="3485272"/>
+            </a:xfrm>
+            <a:prstGeom prst="rect">
+              <a:avLst/>
+            </a:prstGeom>
+          </p:spPr>
+        </p:pic>
+        <p:pic>
+          <p:nvPicPr>
+            <p:cNvPr id="7" name="Image 6"/>
+            <p:cNvPicPr>
+              <a:picLocks noChangeAspect="1"/>
+            </p:cNvPicPr>
+            <p:nvPr/>
+          </p:nvPicPr>
+          <p:blipFill>
+            <a:blip r:embed="rId5">
+              <a:extLst>
+                <a:ext uri="{28A0092B-C50C-407E-A947-70E740481C1C}">
+                  <a14:useLocalDpi xmlns:a14="http://schemas.microsoft.com/office/drawing/2010/main" val="0"/>
+                </a:ext>
+              </a:extLst>
+            </a:blip>
+            <a:stretch>
+              <a:fillRect/>
+            </a:stretch>
+          </p:blipFill>
+          <p:spPr>
+            <a:xfrm>
+              <a:off x="491820" y="107014"/>
+              <a:ext cx="3791377" cy="3578010"/>
+            </a:xfrm>
+            <a:prstGeom prst="rect">
+              <a:avLst/>
+            </a:prstGeom>
+          </p:spPr>
+        </p:pic>
+        <p:sp>
+          <p:nvSpPr>
+            <p:cNvPr id="8" name="ZoneTexte 7"/>
+            <p:cNvSpPr txBox="1"/>
+            <p:nvPr/>
+          </p:nvSpPr>
+          <p:spPr>
+            <a:xfrm>
+              <a:off x="467289" y="404948"/>
+              <a:ext cx="274195" cy="461665"/>
+            </a:xfrm>
+            <a:prstGeom prst="rect">
+              <a:avLst/>
+            </a:prstGeom>
+            <a:noFill/>
+          </p:spPr>
+          <p:txBody>
+            <a:bodyPr wrap="square" rtlCol="0">
+              <a:spAutoFit/>
+            </a:bodyPr>
+            <a:lstStyle/>
+            <a:p>
+              <a:r>
+                <a:rPr lang="fr-FR" sz="2400" b="1" dirty="0" smtClean="0"/>
+                <a:t>a</a:t>
+              </a:r>
+              <a:endParaRPr lang="fr-FR" sz="2400" b="1" dirty="0"/>
+            </a:p>
+          </p:txBody>
+        </p:sp>
+        <p:sp>
+          <p:nvSpPr>
+            <p:cNvPr id="9" name="ZoneTexte 8"/>
+            <p:cNvSpPr txBox="1"/>
+            <p:nvPr/>
+          </p:nvSpPr>
+          <p:spPr>
+            <a:xfrm>
+              <a:off x="4307728" y="404948"/>
+              <a:ext cx="274195" cy="461665"/>
+            </a:xfrm>
+            <a:prstGeom prst="rect">
+              <a:avLst/>
+            </a:prstGeom>
+            <a:noFill/>
+          </p:spPr>
+          <p:txBody>
+            <a:bodyPr wrap="square" rtlCol="0">
+              <a:spAutoFit/>
+            </a:bodyPr>
+            <a:lstStyle/>
+            <a:p>
+              <a:r>
+                <a:rPr lang="fr-FR" sz="2400" b="1" dirty="0" smtClean="0"/>
+                <a:t>b</a:t>
+              </a:r>
+              <a:endParaRPr lang="fr-FR" sz="2400" b="1" dirty="0"/>
+            </a:p>
+          </p:txBody>
+        </p:sp>
+        <p:sp>
+          <p:nvSpPr>
+            <p:cNvPr id="10" name="ZoneTexte 9"/>
+            <p:cNvSpPr txBox="1"/>
+            <p:nvPr/>
+          </p:nvSpPr>
+          <p:spPr>
+            <a:xfrm>
+              <a:off x="509576" y="3407822"/>
+              <a:ext cx="274195" cy="461665"/>
+            </a:xfrm>
+            <a:prstGeom prst="rect">
+              <a:avLst/>
+            </a:prstGeom>
+            <a:noFill/>
+          </p:spPr>
+          <p:txBody>
+            <a:bodyPr wrap="square" rtlCol="0">
+              <a:spAutoFit/>
+            </a:bodyPr>
+            <a:lstStyle/>
+            <a:p>
+              <a:r>
+                <a:rPr lang="fr-FR" sz="2400" b="1" dirty="0" smtClean="0"/>
+                <a:t>c</a:t>
+              </a:r>
+              <a:endParaRPr lang="fr-FR" sz="2400" b="1" dirty="0"/>
+            </a:p>
+          </p:txBody>
+        </p:sp>
+        <p:sp>
+          <p:nvSpPr>
+            <p:cNvPr id="11" name="ZoneTexte 10"/>
+            <p:cNvSpPr txBox="1"/>
+            <p:nvPr/>
+          </p:nvSpPr>
+          <p:spPr>
+            <a:xfrm>
+              <a:off x="4300953" y="3407821"/>
+              <a:ext cx="274195" cy="461665"/>
+            </a:xfrm>
+            <a:prstGeom prst="rect">
+              <a:avLst/>
+            </a:prstGeom>
+            <a:noFill/>
+          </p:spPr>
+          <p:txBody>
+            <a:bodyPr wrap="square" rtlCol="0">
+              <a:spAutoFit/>
+            </a:bodyPr>
+            <a:lstStyle/>
+            <a:p>
+              <a:r>
+                <a:rPr lang="fr-FR" sz="2400" b="1" dirty="0" smtClean="0"/>
+                <a:t>d</a:t>
+              </a:r>
+              <a:endParaRPr lang="fr-FR" sz="2400" b="1" dirty="0"/>
+            </a:p>
+          </p:txBody>
+        </p:sp>
+      </p:grpSp>
+    </p:spTree>
+    <p:extLst>
+      <p:ext uri="{BB962C8B-B14F-4D97-AF65-F5344CB8AC3E}">
+        <p14:creationId xmlns:p14="http://schemas.microsoft.com/office/powerpoint/2010/main" val="1160895129"/>
+      </p:ext>
+    </p:extLst>
+  </p:cSld>
+  <p:clrMapOvr>
+    <a:masterClrMapping/>
+  </p:clrMapOvr>
+</p:sld>
+</file>
+
 <file path=ppt/theme/theme1.xml><?xml version="1.0" encoding="utf-8"?>
 <a:theme xmlns:a="http://schemas.openxmlformats.org/drawingml/2006/main" name="Thème Office">
   <a:themeElements>

</xml_diff>